<commit_message>
Added screenshot. Modified ppt
</commit_message>
<xml_diff>
--- a/Documents/FirstPresentation.pptx
+++ b/Documents/FirstPresentation.pptx
@@ -11,8 +11,13 @@
     <p:sldId id="258" r:id="rId6"/>
     <p:sldId id="259" r:id="rId7"/>
     <p:sldId id="260" r:id="rId8"/>
+    <p:sldId id="261" r:id="rId9"/>
+    <p:sldId id="262" r:id="rId10"/>
+    <p:sldId id="263" r:id="rId11"/>
+    <p:sldId id="264" r:id="rId12"/>
+    <p:sldId id="265" r:id="rId13"/>
   </p:sldIdLst>
-  <p:sldSz cx="10080625" cy="5670550"/>
+  <p:sldSz cx="10077450" cy="5668962"/>
   <p:notesSz cx="7772400" cy="10058400"/>
 </p:presentation>
 </file>
@@ -68,8 +73,8 @@
         </p:nvSpPr>
         <p:spPr>
           <a:xfrm>
-            <a:off x="504000" y="216000"/>
-            <a:ext cx="7019640" cy="935640"/>
+            <a:off x="503640" y="215640"/>
+            <a:ext cx="7016760" cy="935280"/>
           </a:xfrm>
           <a:prstGeom prst="rect">
             <a:avLst/>
@@ -97,8 +102,8 @@
         </p:nvSpPr>
         <p:spPr>
           <a:xfrm>
-            <a:off x="504000" y="1368000"/>
-            <a:ext cx="9071640" cy="1568160"/>
+            <a:off x="503640" y="1367640"/>
+            <a:ext cx="9068040" cy="1567800"/>
           </a:xfrm>
           <a:prstGeom prst="rect">
             <a:avLst/>
@@ -127,8 +132,8 @@
         </p:nvSpPr>
         <p:spPr>
           <a:xfrm>
-            <a:off x="504000" y="3085560"/>
-            <a:ext cx="9071640" cy="1568160"/>
+            <a:off x="503640" y="3084840"/>
+            <a:ext cx="9068040" cy="1567800"/>
           </a:xfrm>
           <a:prstGeom prst="rect">
             <a:avLst/>
@@ -179,8 +184,8 @@
         </p:nvSpPr>
         <p:spPr>
           <a:xfrm>
-            <a:off x="504000" y="216000"/>
-            <a:ext cx="7019640" cy="935640"/>
+            <a:off x="503640" y="215640"/>
+            <a:ext cx="7016760" cy="935280"/>
           </a:xfrm>
           <a:prstGeom prst="rect">
             <a:avLst/>
@@ -208,8 +213,8 @@
         </p:nvSpPr>
         <p:spPr>
           <a:xfrm>
-            <a:off x="504000" y="1368000"/>
-            <a:ext cx="4426920" cy="1568160"/>
+            <a:off x="503640" y="1367640"/>
+            <a:ext cx="4425120" cy="1567800"/>
           </a:xfrm>
           <a:prstGeom prst="rect">
             <a:avLst/>
@@ -238,8 +243,8 @@
         </p:nvSpPr>
         <p:spPr>
           <a:xfrm>
-            <a:off x="5152680" y="1368000"/>
-            <a:ext cx="4426920" cy="1568160"/>
+            <a:off x="5150520" y="1367640"/>
+            <a:ext cx="4425120" cy="1567800"/>
           </a:xfrm>
           <a:prstGeom prst="rect">
             <a:avLst/>
@@ -268,8 +273,8 @@
         </p:nvSpPr>
         <p:spPr>
           <a:xfrm>
-            <a:off x="504000" y="3085560"/>
-            <a:ext cx="4426920" cy="1568160"/>
+            <a:off x="503640" y="3084840"/>
+            <a:ext cx="4425120" cy="1567800"/>
           </a:xfrm>
           <a:prstGeom prst="rect">
             <a:avLst/>
@@ -298,8 +303,8 @@
         </p:nvSpPr>
         <p:spPr>
           <a:xfrm>
-            <a:off x="5152680" y="3085560"/>
-            <a:ext cx="4426920" cy="1568160"/>
+            <a:off x="5150520" y="3084840"/>
+            <a:ext cx="4425120" cy="1567800"/>
           </a:xfrm>
           <a:prstGeom prst="rect">
             <a:avLst/>
@@ -350,8 +355,8 @@
         </p:nvSpPr>
         <p:spPr>
           <a:xfrm>
-            <a:off x="504000" y="216000"/>
-            <a:ext cx="7019640" cy="935640"/>
+            <a:off x="503640" y="215640"/>
+            <a:ext cx="7016760" cy="935280"/>
           </a:xfrm>
           <a:prstGeom prst="rect">
             <a:avLst/>
@@ -379,8 +384,8 @@
         </p:nvSpPr>
         <p:spPr>
           <a:xfrm>
-            <a:off x="504000" y="1368000"/>
-            <a:ext cx="2920680" cy="1568160"/>
+            <a:off x="503640" y="1367640"/>
+            <a:ext cx="2919600" cy="1567800"/>
           </a:xfrm>
           <a:prstGeom prst="rect">
             <a:avLst/>
@@ -409,8 +414,8 @@
         </p:nvSpPr>
         <p:spPr>
           <a:xfrm>
-            <a:off x="3571200" y="1368000"/>
-            <a:ext cx="2920680" cy="1568160"/>
+            <a:off x="3569760" y="1367640"/>
+            <a:ext cx="2919600" cy="1567800"/>
           </a:xfrm>
           <a:prstGeom prst="rect">
             <a:avLst/>
@@ -439,8 +444,8 @@
         </p:nvSpPr>
         <p:spPr>
           <a:xfrm>
-            <a:off x="6638040" y="1368000"/>
-            <a:ext cx="2920680" cy="1568160"/>
+            <a:off x="6635520" y="1367640"/>
+            <a:ext cx="2919600" cy="1567800"/>
           </a:xfrm>
           <a:prstGeom prst="rect">
             <a:avLst/>
@@ -469,8 +474,8 @@
         </p:nvSpPr>
         <p:spPr>
           <a:xfrm>
-            <a:off x="504000" y="3085560"/>
-            <a:ext cx="2920680" cy="1568160"/>
+            <a:off x="503640" y="3084840"/>
+            <a:ext cx="2919600" cy="1567800"/>
           </a:xfrm>
           <a:prstGeom prst="rect">
             <a:avLst/>
@@ -499,8 +504,8 @@
         </p:nvSpPr>
         <p:spPr>
           <a:xfrm>
-            <a:off x="3571200" y="3085560"/>
-            <a:ext cx="2920680" cy="1568160"/>
+            <a:off x="3569760" y="3084840"/>
+            <a:ext cx="2919600" cy="1567800"/>
           </a:xfrm>
           <a:prstGeom prst="rect">
             <a:avLst/>
@@ -529,8 +534,8 @@
         </p:nvSpPr>
         <p:spPr>
           <a:xfrm>
-            <a:off x="6638040" y="3085560"/>
-            <a:ext cx="2920680" cy="1568160"/>
+            <a:off x="6635520" y="3084840"/>
+            <a:ext cx="2919600" cy="1567800"/>
           </a:xfrm>
           <a:prstGeom prst="rect">
             <a:avLst/>
@@ -603,8 +608,8 @@
         </p:nvSpPr>
         <p:spPr>
           <a:xfrm>
-            <a:off x="504000" y="216000"/>
-            <a:ext cx="7019640" cy="935640"/>
+            <a:off x="503640" y="215640"/>
+            <a:ext cx="7016760" cy="935280"/>
           </a:xfrm>
           <a:prstGeom prst="rect">
             <a:avLst/>
@@ -632,8 +637,8 @@
         </p:nvSpPr>
         <p:spPr>
           <a:xfrm>
-            <a:off x="504000" y="1368000"/>
-            <a:ext cx="9071640" cy="3287880"/>
+            <a:off x="503640" y="1367640"/>
+            <a:ext cx="9068040" cy="3287160"/>
           </a:xfrm>
           <a:prstGeom prst="rect">
             <a:avLst/>
@@ -683,8 +688,8 @@
         </p:nvSpPr>
         <p:spPr>
           <a:xfrm>
-            <a:off x="504000" y="216000"/>
-            <a:ext cx="7019640" cy="935640"/>
+            <a:off x="503640" y="215640"/>
+            <a:ext cx="7016760" cy="935280"/>
           </a:xfrm>
           <a:prstGeom prst="rect">
             <a:avLst/>
@@ -712,8 +717,8 @@
         </p:nvSpPr>
         <p:spPr>
           <a:xfrm>
-            <a:off x="504000" y="1368000"/>
-            <a:ext cx="9071640" cy="3287880"/>
+            <a:off x="503640" y="1367640"/>
+            <a:ext cx="9068040" cy="3287160"/>
           </a:xfrm>
           <a:prstGeom prst="rect">
             <a:avLst/>
@@ -764,8 +769,8 @@
         </p:nvSpPr>
         <p:spPr>
           <a:xfrm>
-            <a:off x="504000" y="216000"/>
-            <a:ext cx="7019640" cy="935640"/>
+            <a:off x="503640" y="215640"/>
+            <a:ext cx="7016760" cy="935280"/>
           </a:xfrm>
           <a:prstGeom prst="rect">
             <a:avLst/>
@@ -793,8 +798,8 @@
         </p:nvSpPr>
         <p:spPr>
           <a:xfrm>
-            <a:off x="504000" y="1368000"/>
-            <a:ext cx="4426920" cy="3287880"/>
+            <a:off x="503640" y="1367640"/>
+            <a:ext cx="4425120" cy="3287160"/>
           </a:xfrm>
           <a:prstGeom prst="rect">
             <a:avLst/>
@@ -823,8 +828,8 @@
         </p:nvSpPr>
         <p:spPr>
           <a:xfrm>
-            <a:off x="5152680" y="1368000"/>
-            <a:ext cx="4426920" cy="3287880"/>
+            <a:off x="5150520" y="1367640"/>
+            <a:ext cx="4425120" cy="3287160"/>
           </a:xfrm>
           <a:prstGeom prst="rect">
             <a:avLst/>
@@ -875,8 +880,8 @@
         </p:nvSpPr>
         <p:spPr>
           <a:xfrm>
-            <a:off x="504000" y="216000"/>
-            <a:ext cx="7019640" cy="935640"/>
+            <a:off x="503640" y="215640"/>
+            <a:ext cx="7016760" cy="935280"/>
           </a:xfrm>
           <a:prstGeom prst="rect">
             <a:avLst/>
@@ -926,8 +931,8 @@
         </p:nvSpPr>
         <p:spPr>
           <a:xfrm>
-            <a:off x="504000" y="216000"/>
-            <a:ext cx="7019640" cy="4338360"/>
+            <a:off x="503640" y="215640"/>
+            <a:ext cx="7016760" cy="4336560"/>
           </a:xfrm>
           <a:prstGeom prst="rect">
             <a:avLst/>
@@ -977,8 +982,8 @@
         </p:nvSpPr>
         <p:spPr>
           <a:xfrm>
-            <a:off x="504000" y="216000"/>
-            <a:ext cx="7019640" cy="935640"/>
+            <a:off x="503640" y="215640"/>
+            <a:ext cx="7016760" cy="935280"/>
           </a:xfrm>
           <a:prstGeom prst="rect">
             <a:avLst/>
@@ -1006,8 +1011,8 @@
         </p:nvSpPr>
         <p:spPr>
           <a:xfrm>
-            <a:off x="504000" y="1368000"/>
-            <a:ext cx="4426920" cy="1568160"/>
+            <a:off x="503640" y="1367640"/>
+            <a:ext cx="4425120" cy="1567800"/>
           </a:xfrm>
           <a:prstGeom prst="rect">
             <a:avLst/>
@@ -1036,8 +1041,8 @@
         </p:nvSpPr>
         <p:spPr>
           <a:xfrm>
-            <a:off x="5152680" y="1368000"/>
-            <a:ext cx="4426920" cy="3287880"/>
+            <a:off x="5150520" y="1367640"/>
+            <a:ext cx="4425120" cy="3287160"/>
           </a:xfrm>
           <a:prstGeom prst="rect">
             <a:avLst/>
@@ -1066,8 +1071,8 @@
         </p:nvSpPr>
         <p:spPr>
           <a:xfrm>
-            <a:off x="504000" y="3085560"/>
-            <a:ext cx="4426920" cy="1568160"/>
+            <a:off x="503640" y="3084840"/>
+            <a:ext cx="4425120" cy="1567800"/>
           </a:xfrm>
           <a:prstGeom prst="rect">
             <a:avLst/>
@@ -1118,8 +1123,8 @@
         </p:nvSpPr>
         <p:spPr>
           <a:xfrm>
-            <a:off x="504000" y="216000"/>
-            <a:ext cx="7019640" cy="935640"/>
+            <a:off x="503640" y="215640"/>
+            <a:ext cx="7016760" cy="935280"/>
           </a:xfrm>
           <a:prstGeom prst="rect">
             <a:avLst/>
@@ -1147,8 +1152,8 @@
         </p:nvSpPr>
         <p:spPr>
           <a:xfrm>
-            <a:off x="504000" y="1368000"/>
-            <a:ext cx="9071640" cy="3287880"/>
+            <a:off x="503640" y="1367640"/>
+            <a:ext cx="9068040" cy="3287160"/>
           </a:xfrm>
           <a:prstGeom prst="rect">
             <a:avLst/>
@@ -1198,8 +1203,8 @@
         </p:nvSpPr>
         <p:spPr>
           <a:xfrm>
-            <a:off x="504000" y="216000"/>
-            <a:ext cx="7019640" cy="935640"/>
+            <a:off x="503640" y="215640"/>
+            <a:ext cx="7016760" cy="935280"/>
           </a:xfrm>
           <a:prstGeom prst="rect">
             <a:avLst/>
@@ -1227,8 +1232,8 @@
         </p:nvSpPr>
         <p:spPr>
           <a:xfrm>
-            <a:off x="504000" y="1368000"/>
-            <a:ext cx="4426920" cy="3287880"/>
+            <a:off x="503640" y="1367640"/>
+            <a:ext cx="4425120" cy="3287160"/>
           </a:xfrm>
           <a:prstGeom prst="rect">
             <a:avLst/>
@@ -1257,8 +1262,8 @@
         </p:nvSpPr>
         <p:spPr>
           <a:xfrm>
-            <a:off x="5152680" y="1368000"/>
-            <a:ext cx="4426920" cy="1568160"/>
+            <a:off x="5150520" y="1367640"/>
+            <a:ext cx="4425120" cy="1567800"/>
           </a:xfrm>
           <a:prstGeom prst="rect">
             <a:avLst/>
@@ -1287,8 +1292,8 @@
         </p:nvSpPr>
         <p:spPr>
           <a:xfrm>
-            <a:off x="5152680" y="3085560"/>
-            <a:ext cx="4426920" cy="1568160"/>
+            <a:off x="5150520" y="3084840"/>
+            <a:ext cx="4425120" cy="1567800"/>
           </a:xfrm>
           <a:prstGeom prst="rect">
             <a:avLst/>
@@ -1339,8 +1344,8 @@
         </p:nvSpPr>
         <p:spPr>
           <a:xfrm>
-            <a:off x="504000" y="216000"/>
-            <a:ext cx="7019640" cy="935640"/>
+            <a:off x="503640" y="215640"/>
+            <a:ext cx="7016760" cy="935280"/>
           </a:xfrm>
           <a:prstGeom prst="rect">
             <a:avLst/>
@@ -1368,8 +1373,8 @@
         </p:nvSpPr>
         <p:spPr>
           <a:xfrm>
-            <a:off x="504000" y="1368000"/>
-            <a:ext cx="4426920" cy="1568160"/>
+            <a:off x="503640" y="1367640"/>
+            <a:ext cx="4425120" cy="1567800"/>
           </a:xfrm>
           <a:prstGeom prst="rect">
             <a:avLst/>
@@ -1398,8 +1403,8 @@
         </p:nvSpPr>
         <p:spPr>
           <a:xfrm>
-            <a:off x="5152680" y="1368000"/>
-            <a:ext cx="4426920" cy="1568160"/>
+            <a:off x="5150520" y="1367640"/>
+            <a:ext cx="4425120" cy="1567800"/>
           </a:xfrm>
           <a:prstGeom prst="rect">
             <a:avLst/>
@@ -1428,8 +1433,8 @@
         </p:nvSpPr>
         <p:spPr>
           <a:xfrm>
-            <a:off x="504000" y="3085560"/>
-            <a:ext cx="9071640" cy="1568160"/>
+            <a:off x="503640" y="3084840"/>
+            <a:ext cx="9068040" cy="1567800"/>
           </a:xfrm>
           <a:prstGeom prst="rect">
             <a:avLst/>
@@ -1480,8 +1485,8 @@
         </p:nvSpPr>
         <p:spPr>
           <a:xfrm>
-            <a:off x="504000" y="216000"/>
-            <a:ext cx="7019640" cy="935640"/>
+            <a:off x="503640" y="215640"/>
+            <a:ext cx="7016760" cy="935280"/>
           </a:xfrm>
           <a:prstGeom prst="rect">
             <a:avLst/>
@@ -1509,8 +1514,8 @@
         </p:nvSpPr>
         <p:spPr>
           <a:xfrm>
-            <a:off x="504000" y="1368000"/>
-            <a:ext cx="9071640" cy="1568160"/>
+            <a:off x="503640" y="1367640"/>
+            <a:ext cx="9068040" cy="1567800"/>
           </a:xfrm>
           <a:prstGeom prst="rect">
             <a:avLst/>
@@ -1539,8 +1544,8 @@
         </p:nvSpPr>
         <p:spPr>
           <a:xfrm>
-            <a:off x="504000" y="3085560"/>
-            <a:ext cx="9071640" cy="1568160"/>
+            <a:off x="503640" y="3084840"/>
+            <a:ext cx="9068040" cy="1567800"/>
           </a:xfrm>
           <a:prstGeom prst="rect">
             <a:avLst/>
@@ -1591,8 +1596,8 @@
         </p:nvSpPr>
         <p:spPr>
           <a:xfrm>
-            <a:off x="504000" y="216000"/>
-            <a:ext cx="7019640" cy="935640"/>
+            <a:off x="503640" y="215640"/>
+            <a:ext cx="7016760" cy="935280"/>
           </a:xfrm>
           <a:prstGeom prst="rect">
             <a:avLst/>
@@ -1620,8 +1625,8 @@
         </p:nvSpPr>
         <p:spPr>
           <a:xfrm>
-            <a:off x="504000" y="1368000"/>
-            <a:ext cx="4426920" cy="1568160"/>
+            <a:off x="503640" y="1367640"/>
+            <a:ext cx="4425120" cy="1567800"/>
           </a:xfrm>
           <a:prstGeom prst="rect">
             <a:avLst/>
@@ -1650,8 +1655,8 @@
         </p:nvSpPr>
         <p:spPr>
           <a:xfrm>
-            <a:off x="5152680" y="1368000"/>
-            <a:ext cx="4426920" cy="1568160"/>
+            <a:off x="5150520" y="1367640"/>
+            <a:ext cx="4425120" cy="1567800"/>
           </a:xfrm>
           <a:prstGeom prst="rect">
             <a:avLst/>
@@ -1680,8 +1685,8 @@
         </p:nvSpPr>
         <p:spPr>
           <a:xfrm>
-            <a:off x="504000" y="3085560"/>
-            <a:ext cx="4426920" cy="1568160"/>
+            <a:off x="503640" y="3084840"/>
+            <a:ext cx="4425120" cy="1567800"/>
           </a:xfrm>
           <a:prstGeom prst="rect">
             <a:avLst/>
@@ -1710,8 +1715,8 @@
         </p:nvSpPr>
         <p:spPr>
           <a:xfrm>
-            <a:off x="5152680" y="3085560"/>
-            <a:ext cx="4426920" cy="1568160"/>
+            <a:off x="5150520" y="3084840"/>
+            <a:ext cx="4425120" cy="1567800"/>
           </a:xfrm>
           <a:prstGeom prst="rect">
             <a:avLst/>
@@ -1762,8 +1767,8 @@
         </p:nvSpPr>
         <p:spPr>
           <a:xfrm>
-            <a:off x="504000" y="216000"/>
-            <a:ext cx="7019640" cy="935640"/>
+            <a:off x="503640" y="215640"/>
+            <a:ext cx="7016760" cy="935280"/>
           </a:xfrm>
           <a:prstGeom prst="rect">
             <a:avLst/>
@@ -1791,8 +1796,8 @@
         </p:nvSpPr>
         <p:spPr>
           <a:xfrm>
-            <a:off x="504000" y="1368000"/>
-            <a:ext cx="2920680" cy="1568160"/>
+            <a:off x="503640" y="1367640"/>
+            <a:ext cx="2919600" cy="1567800"/>
           </a:xfrm>
           <a:prstGeom prst="rect">
             <a:avLst/>
@@ -1821,8 +1826,8 @@
         </p:nvSpPr>
         <p:spPr>
           <a:xfrm>
-            <a:off x="3571200" y="1368000"/>
-            <a:ext cx="2920680" cy="1568160"/>
+            <a:off x="3569760" y="1367640"/>
+            <a:ext cx="2919600" cy="1567800"/>
           </a:xfrm>
           <a:prstGeom prst="rect">
             <a:avLst/>
@@ -1851,8 +1856,8 @@
         </p:nvSpPr>
         <p:spPr>
           <a:xfrm>
-            <a:off x="6638040" y="1368000"/>
-            <a:ext cx="2920680" cy="1568160"/>
+            <a:off x="6635520" y="1367640"/>
+            <a:ext cx="2919600" cy="1567800"/>
           </a:xfrm>
           <a:prstGeom prst="rect">
             <a:avLst/>
@@ -1881,8 +1886,8 @@
         </p:nvSpPr>
         <p:spPr>
           <a:xfrm>
-            <a:off x="504000" y="3085560"/>
-            <a:ext cx="2920680" cy="1568160"/>
+            <a:off x="503640" y="3084840"/>
+            <a:ext cx="2919600" cy="1567800"/>
           </a:xfrm>
           <a:prstGeom prst="rect">
             <a:avLst/>
@@ -1911,8 +1916,8 @@
         </p:nvSpPr>
         <p:spPr>
           <a:xfrm>
-            <a:off x="3571200" y="3085560"/>
-            <a:ext cx="2920680" cy="1568160"/>
+            <a:off x="3569760" y="3084840"/>
+            <a:ext cx="2919600" cy="1567800"/>
           </a:xfrm>
           <a:prstGeom prst="rect">
             <a:avLst/>
@@ -1941,8 +1946,8 @@
         </p:nvSpPr>
         <p:spPr>
           <a:xfrm>
-            <a:off x="6638040" y="3085560"/>
-            <a:ext cx="2920680" cy="1568160"/>
+            <a:off x="6635520" y="3084840"/>
+            <a:ext cx="2919600" cy="1567800"/>
           </a:xfrm>
           <a:prstGeom prst="rect">
             <a:avLst/>
@@ -1993,8 +1998,8 @@
         </p:nvSpPr>
         <p:spPr>
           <a:xfrm>
-            <a:off x="504000" y="216000"/>
-            <a:ext cx="7019640" cy="935640"/>
+            <a:off x="503640" y="215640"/>
+            <a:ext cx="7016760" cy="935280"/>
           </a:xfrm>
           <a:prstGeom prst="rect">
             <a:avLst/>
@@ -2022,8 +2027,8 @@
         </p:nvSpPr>
         <p:spPr>
           <a:xfrm>
-            <a:off x="504000" y="1368000"/>
-            <a:ext cx="9071640" cy="3287880"/>
+            <a:off x="503640" y="1367640"/>
+            <a:ext cx="9068040" cy="3287160"/>
           </a:xfrm>
           <a:prstGeom prst="rect">
             <a:avLst/>
@@ -2074,8 +2079,8 @@
         </p:nvSpPr>
         <p:spPr>
           <a:xfrm>
-            <a:off x="504000" y="216000"/>
-            <a:ext cx="7019640" cy="935640"/>
+            <a:off x="503640" y="215640"/>
+            <a:ext cx="7016760" cy="935280"/>
           </a:xfrm>
           <a:prstGeom prst="rect">
             <a:avLst/>
@@ -2103,8 +2108,8 @@
         </p:nvSpPr>
         <p:spPr>
           <a:xfrm>
-            <a:off x="504000" y="1368000"/>
-            <a:ext cx="4426920" cy="3287880"/>
+            <a:off x="503640" y="1367640"/>
+            <a:ext cx="4425120" cy="3287160"/>
           </a:xfrm>
           <a:prstGeom prst="rect">
             <a:avLst/>
@@ -2133,8 +2138,8 @@
         </p:nvSpPr>
         <p:spPr>
           <a:xfrm>
-            <a:off x="5152680" y="1368000"/>
-            <a:ext cx="4426920" cy="3287880"/>
+            <a:off x="5150520" y="1367640"/>
+            <a:ext cx="4425120" cy="3287160"/>
           </a:xfrm>
           <a:prstGeom prst="rect">
             <a:avLst/>
@@ -2185,8 +2190,8 @@
         </p:nvSpPr>
         <p:spPr>
           <a:xfrm>
-            <a:off x="504000" y="216000"/>
-            <a:ext cx="7019640" cy="935640"/>
+            <a:off x="503640" y="215640"/>
+            <a:ext cx="7016760" cy="935280"/>
           </a:xfrm>
           <a:prstGeom prst="rect">
             <a:avLst/>
@@ -2236,8 +2241,8 @@
         </p:nvSpPr>
         <p:spPr>
           <a:xfrm>
-            <a:off x="504000" y="216000"/>
-            <a:ext cx="7019640" cy="4338360"/>
+            <a:off x="503640" y="215640"/>
+            <a:ext cx="7016760" cy="4336560"/>
           </a:xfrm>
           <a:prstGeom prst="rect">
             <a:avLst/>
@@ -2287,8 +2292,8 @@
         </p:nvSpPr>
         <p:spPr>
           <a:xfrm>
-            <a:off x="504000" y="216000"/>
-            <a:ext cx="7019640" cy="935640"/>
+            <a:off x="503640" y="215640"/>
+            <a:ext cx="7016760" cy="935280"/>
           </a:xfrm>
           <a:prstGeom prst="rect">
             <a:avLst/>
@@ -2316,8 +2321,8 @@
         </p:nvSpPr>
         <p:spPr>
           <a:xfrm>
-            <a:off x="504000" y="1368000"/>
-            <a:ext cx="4426920" cy="1568160"/>
+            <a:off x="503640" y="1367640"/>
+            <a:ext cx="4425120" cy="1567800"/>
           </a:xfrm>
           <a:prstGeom prst="rect">
             <a:avLst/>
@@ -2346,8 +2351,8 @@
         </p:nvSpPr>
         <p:spPr>
           <a:xfrm>
-            <a:off x="5152680" y="1368000"/>
-            <a:ext cx="4426920" cy="3287880"/>
+            <a:off x="5150520" y="1367640"/>
+            <a:ext cx="4425120" cy="3287160"/>
           </a:xfrm>
           <a:prstGeom prst="rect">
             <a:avLst/>
@@ -2376,8 +2381,8 @@
         </p:nvSpPr>
         <p:spPr>
           <a:xfrm>
-            <a:off x="504000" y="3085560"/>
-            <a:ext cx="4426920" cy="1568160"/>
+            <a:off x="503640" y="3084840"/>
+            <a:ext cx="4425120" cy="1567800"/>
           </a:xfrm>
           <a:prstGeom prst="rect">
             <a:avLst/>
@@ -2428,8 +2433,8 @@
         </p:nvSpPr>
         <p:spPr>
           <a:xfrm>
-            <a:off x="504000" y="216000"/>
-            <a:ext cx="7019640" cy="935640"/>
+            <a:off x="503640" y="215640"/>
+            <a:ext cx="7016760" cy="935280"/>
           </a:xfrm>
           <a:prstGeom prst="rect">
             <a:avLst/>
@@ -2457,8 +2462,8 @@
         </p:nvSpPr>
         <p:spPr>
           <a:xfrm>
-            <a:off x="504000" y="1368000"/>
-            <a:ext cx="4426920" cy="3287880"/>
+            <a:off x="503640" y="1367640"/>
+            <a:ext cx="4425120" cy="3287160"/>
           </a:xfrm>
           <a:prstGeom prst="rect">
             <a:avLst/>
@@ -2487,8 +2492,8 @@
         </p:nvSpPr>
         <p:spPr>
           <a:xfrm>
-            <a:off x="5152680" y="1368000"/>
-            <a:ext cx="4426920" cy="1568160"/>
+            <a:off x="5150520" y="1367640"/>
+            <a:ext cx="4425120" cy="1567800"/>
           </a:xfrm>
           <a:prstGeom prst="rect">
             <a:avLst/>
@@ -2517,8 +2522,8 @@
         </p:nvSpPr>
         <p:spPr>
           <a:xfrm>
-            <a:off x="5152680" y="3085560"/>
-            <a:ext cx="4426920" cy="1568160"/>
+            <a:off x="5150520" y="3084840"/>
+            <a:ext cx="4425120" cy="1567800"/>
           </a:xfrm>
           <a:prstGeom prst="rect">
             <a:avLst/>
@@ -2569,8 +2574,8 @@
         </p:nvSpPr>
         <p:spPr>
           <a:xfrm>
-            <a:off x="504000" y="216000"/>
-            <a:ext cx="7019640" cy="935640"/>
+            <a:off x="503640" y="215640"/>
+            <a:ext cx="7016760" cy="935280"/>
           </a:xfrm>
           <a:prstGeom prst="rect">
             <a:avLst/>
@@ -2598,8 +2603,8 @@
         </p:nvSpPr>
         <p:spPr>
           <a:xfrm>
-            <a:off x="504000" y="1368000"/>
-            <a:ext cx="4426920" cy="1568160"/>
+            <a:off x="503640" y="1367640"/>
+            <a:ext cx="4425120" cy="1567800"/>
           </a:xfrm>
           <a:prstGeom prst="rect">
             <a:avLst/>
@@ -2628,8 +2633,8 @@
         </p:nvSpPr>
         <p:spPr>
           <a:xfrm>
-            <a:off x="5152680" y="1368000"/>
-            <a:ext cx="4426920" cy="1568160"/>
+            <a:off x="5150520" y="1367640"/>
+            <a:ext cx="4425120" cy="1567800"/>
           </a:xfrm>
           <a:prstGeom prst="rect">
             <a:avLst/>
@@ -2658,8 +2663,8 @@
         </p:nvSpPr>
         <p:spPr>
           <a:xfrm>
-            <a:off x="504000" y="3085560"/>
-            <a:ext cx="9071640" cy="1568160"/>
+            <a:off x="503640" y="3084840"/>
+            <a:ext cx="9068040" cy="1567800"/>
           </a:xfrm>
           <a:prstGeom prst="rect">
             <a:avLst/>
@@ -2710,8 +2715,8 @@
         </p:blipFill>
         <p:spPr>
           <a:xfrm>
-            <a:off x="-58320" y="81000"/>
-            <a:ext cx="7794000" cy="1205280"/>
+            <a:off x="-57960" y="80640"/>
+            <a:ext cx="7790760" cy="1204920"/>
           </a:xfrm>
           <a:prstGeom prst="rect">
             <a:avLst/>
@@ -2733,8 +2738,8 @@
         </p:nvSpPr>
         <p:spPr>
           <a:xfrm>
-            <a:off x="504000" y="216000"/>
-            <a:ext cx="7019640" cy="935640"/>
+            <a:off x="503640" y="215640"/>
+            <a:ext cx="7016760" cy="935280"/>
           </a:xfrm>
           <a:prstGeom prst="rect">
             <a:avLst/>
@@ -2767,8 +2772,8 @@
         </p:nvSpPr>
         <p:spPr>
           <a:xfrm>
-            <a:off x="504000" y="1326600"/>
-            <a:ext cx="9072000" cy="3288600"/>
+            <a:off x="503640" y="1326240"/>
+            <a:ext cx="9068400" cy="3287880"/>
           </a:xfrm>
           <a:prstGeom prst="rect">
             <a:avLst/>
@@ -2781,7 +2786,7 @@
           <a:p>
             <a:pPr marL="432000" indent="-324000">
               <a:spcBef>
-                <a:spcPts val="1417"/>
+                <a:spcPts val="1414"/>
               </a:spcBef>
               <a:buClr>
                 <a:srgbClr val="000000"/>
@@ -2809,7 +2814,7 @@
           <a:p>
             <a:pPr lvl="1" marL="864000" indent="-324000">
               <a:spcBef>
-                <a:spcPts val="1134"/>
+                <a:spcPts val="1131"/>
               </a:spcBef>
               <a:buClr>
                 <a:srgbClr val="000000"/>
@@ -2822,7 +2827,13 @@
               <a:rPr b="0" lang="en-US" sz="2800" spc="-1" strike="noStrike">
                 <a:latin typeface="Arial"/>
               </a:rPr>
-              <a:t>Second Outline Level</a:t>
+              <a:t>Second Outline </a:t>
+            </a:r>
+            <a:r>
+              <a:rPr b="0" lang="en-US" sz="2800" spc="-1" strike="noStrike">
+                <a:latin typeface="Arial"/>
+              </a:rPr>
+              <a:t>Level</a:t>
             </a:r>
             <a:endParaRPr b="0" lang="en-US" sz="2800" spc="-1" strike="noStrike">
               <a:latin typeface="Arial"/>
@@ -2831,7 +2842,7 @@
           <a:p>
             <a:pPr lvl="2" marL="1296000" indent="-288000">
               <a:spcBef>
-                <a:spcPts val="850"/>
+                <a:spcPts val="848"/>
               </a:spcBef>
               <a:buClr>
                 <a:srgbClr val="000000"/>
@@ -2853,7 +2864,7 @@
           <a:p>
             <a:pPr lvl="3" marL="1728000" indent="-216000">
               <a:spcBef>
-                <a:spcPts val="567"/>
+                <a:spcPts val="564"/>
               </a:spcBef>
               <a:buClr>
                 <a:srgbClr val="000000"/>
@@ -2875,7 +2886,7 @@
           <a:p>
             <a:pPr lvl="4" marL="2160000" indent="-216000">
               <a:spcBef>
-                <a:spcPts val="283"/>
+                <a:spcPts val="281"/>
               </a:spcBef>
               <a:buClr>
                 <a:srgbClr val="000000"/>
@@ -2888,7 +2899,13 @@
               <a:rPr b="0" lang="en-US" sz="2000" spc="-1" strike="noStrike">
                 <a:latin typeface="Arial"/>
               </a:rPr>
-              <a:t>Fifth Outline Level</a:t>
+              <a:t>Fifth Outline </a:t>
+            </a:r>
+            <a:r>
+              <a:rPr b="0" lang="en-US" sz="2000" spc="-1" strike="noStrike">
+                <a:latin typeface="Arial"/>
+              </a:rPr>
+              <a:t>Level</a:t>
             </a:r>
             <a:endParaRPr b="0" lang="en-US" sz="2000" spc="-1" strike="noStrike">
               <a:latin typeface="Arial"/>
@@ -2897,7 +2914,7 @@
           <a:p>
             <a:pPr lvl="5" marL="2592000" indent="-216000">
               <a:spcBef>
-                <a:spcPts val="283"/>
+                <a:spcPts val="281"/>
               </a:spcBef>
               <a:buClr>
                 <a:srgbClr val="000000"/>
@@ -2925,7 +2942,7 @@
           <a:p>
             <a:pPr lvl="6" marL="3024000" indent="-216000">
               <a:spcBef>
-                <a:spcPts val="283"/>
+                <a:spcPts val="281"/>
               </a:spcBef>
               <a:buClr>
                 <a:srgbClr val="000000"/>
@@ -3007,8 +3024,8 @@
         </p:blipFill>
         <p:spPr>
           <a:xfrm>
-            <a:off x="-58320" y="81000"/>
-            <a:ext cx="7794000" cy="1205280"/>
+            <a:off x="-57960" y="80640"/>
+            <a:ext cx="7790760" cy="1204920"/>
           </a:xfrm>
           <a:prstGeom prst="rect">
             <a:avLst/>
@@ -3030,8 +3047,8 @@
         </p:nvSpPr>
         <p:spPr>
           <a:xfrm>
-            <a:off x="504000" y="216000"/>
-            <a:ext cx="7019640" cy="935640"/>
+            <a:off x="503640" y="215640"/>
+            <a:ext cx="7016760" cy="935280"/>
           </a:xfrm>
           <a:prstGeom prst="rect">
             <a:avLst/>
@@ -3064,8 +3081,8 @@
         </p:nvSpPr>
         <p:spPr>
           <a:xfrm>
-            <a:off x="504000" y="1368000"/>
-            <a:ext cx="9071640" cy="3287880"/>
+            <a:off x="503640" y="1367640"/>
+            <a:ext cx="9068040" cy="3287160"/>
           </a:xfrm>
           <a:prstGeom prst="rect">
             <a:avLst/>
@@ -3078,7 +3095,7 @@
           <a:p>
             <a:pPr marL="432000" indent="-324000">
               <a:spcBef>
-                <a:spcPts val="1417"/>
+                <a:spcPts val="1414"/>
               </a:spcBef>
               <a:buClr>
                 <a:srgbClr val="000000"/>
@@ -3100,7 +3117,7 @@
           <a:p>
             <a:pPr lvl="1" marL="864000" indent="-324000">
               <a:spcBef>
-                <a:spcPts val="1134"/>
+                <a:spcPts val="1131"/>
               </a:spcBef>
               <a:buClr>
                 <a:srgbClr val="000000"/>
@@ -3122,7 +3139,7 @@
           <a:p>
             <a:pPr lvl="2" marL="1296000" indent="-288000">
               <a:spcBef>
-                <a:spcPts val="850"/>
+                <a:spcPts val="848"/>
               </a:spcBef>
               <a:buClr>
                 <a:srgbClr val="000000"/>
@@ -3144,7 +3161,7 @@
           <a:p>
             <a:pPr lvl="3" marL="1728000" indent="-216000">
               <a:spcBef>
-                <a:spcPts val="567"/>
+                <a:spcPts val="564"/>
               </a:spcBef>
               <a:buClr>
                 <a:srgbClr val="000000"/>
@@ -3166,7 +3183,7 @@
           <a:p>
             <a:pPr lvl="4" marL="2160000" indent="-216000">
               <a:spcBef>
-                <a:spcPts val="283"/>
+                <a:spcPts val="281"/>
               </a:spcBef>
               <a:buClr>
                 <a:srgbClr val="000000"/>
@@ -3188,7 +3205,7 @@
           <a:p>
             <a:pPr lvl="5" marL="2592000" indent="-216000">
               <a:spcBef>
-                <a:spcPts val="283"/>
+                <a:spcPts val="281"/>
               </a:spcBef>
               <a:buClr>
                 <a:srgbClr val="000000"/>
@@ -3210,7 +3227,7 @@
           <a:p>
             <a:pPr lvl="6" marL="3024000" indent="-216000">
               <a:spcBef>
-                <a:spcPts val="283"/>
+                <a:spcPts val="281"/>
               </a:spcBef>
               <a:buClr>
                 <a:srgbClr val="000000"/>
@@ -3276,8 +3293,8 @@
         </p:nvSpPr>
         <p:spPr>
           <a:xfrm>
-            <a:off x="504000" y="177840"/>
-            <a:ext cx="7019640" cy="1012320"/>
+            <a:off x="503640" y="177480"/>
+            <a:ext cx="7016760" cy="1011960"/>
           </a:xfrm>
           <a:prstGeom prst="rect">
             <a:avLst/>
@@ -3324,8 +3341,8 @@
         </p:nvSpPr>
         <p:spPr>
           <a:xfrm>
-            <a:off x="504000" y="1368000"/>
-            <a:ext cx="9071640" cy="3287880"/>
+            <a:off x="503640" y="1367640"/>
+            <a:ext cx="9068040" cy="3287160"/>
           </a:xfrm>
           <a:prstGeom prst="rect">
             <a:avLst/>
@@ -3370,6 +3387,159 @@
           <p:childTnLst>
             <p:seq>
               <p:cTn id="2" dur="indefinite" nodeType="mainSeq"/>
+              <p:prevCondLst>
+                <p:cond delay="0" evt="onPrev">
+                  <p:tgtEl>
+                    <p:sldTgt/>
+                  </p:tgtEl>
+                </p:cond>
+              </p:prevCondLst>
+              <p:nextCondLst>
+                <p:cond delay="0" evt="onNext">
+                  <p:tgtEl>
+                    <p:sldTgt/>
+                  </p:tgtEl>
+                </p:cond>
+              </p:nextCondLst>
+            </p:seq>
+          </p:childTnLst>
+        </p:cTn>
+      </p:par>
+    </p:tnLst>
+  </p:timing>
+</p:sld>
+</file>
+
+<file path=ppt/slides/slide10.xml><?xml version="1.0" encoding="utf-8"?>
+<p:sld xmlns:a="http://schemas.openxmlformats.org/drawingml/2006/main" xmlns:p="http://schemas.openxmlformats.org/presentationml/2006/main" xmlns:r="http://schemas.openxmlformats.org/officeDocument/2006/relationships" xmlns:p14="http://schemas.microsoft.com/office/powerpoint/2010/main" xmlns:p15="http://schemas.microsoft.com/office/powerpoint/2012/main" xmlns:mc="http://schemas.openxmlformats.org/markup-compatibility/2006">
+  <p:cSld>
+    <p:spTree>
+      <p:nvGrpSpPr>
+        <p:cNvPr id="1" name=""/>
+        <p:cNvGrpSpPr/>
+        <p:nvPr/>
+      </p:nvGrpSpPr>
+      <p:grpSpPr>
+        <a:xfrm>
+          <a:off x="0" y="0"/>
+          <a:ext cx="0" cy="0"/>
+          <a:chOff x="0" y="0"/>
+          <a:chExt cx="0" cy="0"/>
+        </a:xfrm>
+      </p:grpSpPr>
+      <p:sp>
+        <p:nvSpPr>
+          <p:cNvPr id="95" name="TextShape 1"/>
+          <p:cNvSpPr txBox="1"/>
+          <p:nvPr/>
+        </p:nvSpPr>
+        <p:spPr>
+          <a:xfrm>
+            <a:off x="503640" y="215640"/>
+            <a:ext cx="7016760" cy="935280"/>
+          </a:xfrm>
+          <a:prstGeom prst="rect">
+            <a:avLst/>
+          </a:prstGeom>
+          <a:noFill/>
+          <a:ln>
+            <a:noFill/>
+          </a:ln>
+        </p:spPr>
+        <p:txBody>
+          <a:bodyPr lIns="0" rIns="0" tIns="0" bIns="0" anchor="ctr"/>
+          <a:p>
+            <a:pPr algn="ctr"/>
+            <a:r>
+              <a:rPr b="0" lang="en-US" sz="4400" spc="-1" strike="noStrike">
+                <a:latin typeface="Arial"/>
+              </a:rPr>
+              <a:t>The Result(real time)</a:t>
+            </a:r>
+            <a:endParaRPr b="0" lang="en-US" sz="4400" spc="-1" strike="noStrike">
+              <a:latin typeface="Arial"/>
+            </a:endParaRPr>
+          </a:p>
+        </p:txBody>
+      </p:sp>
+      <p:pic>
+        <p:nvPicPr>
+          <p:cNvPr id="96" name="" descr=""/>
+          <p:cNvPicPr/>
+          <p:nvPr/>
+        </p:nvPicPr>
+        <p:blipFill>
+          <a:blip r:embed="rId1"/>
+          <a:stretch/>
+        </p:blipFill>
+        <p:spPr>
+          <a:xfrm>
+            <a:off x="3562560" y="1844640"/>
+            <a:ext cx="3112560" cy="2635920"/>
+          </a:xfrm>
+          <a:prstGeom prst="rect">
+            <a:avLst/>
+          </a:prstGeom>
+          <a:ln>
+            <a:noFill/>
+          </a:ln>
+        </p:spPr>
+      </p:pic>
+      <p:pic>
+        <p:nvPicPr>
+          <p:cNvPr id="97" name="" descr=""/>
+          <p:cNvPicPr/>
+          <p:nvPr/>
+        </p:nvPicPr>
+        <p:blipFill>
+          <a:blip r:embed="rId2"/>
+          <a:stretch/>
+        </p:blipFill>
+        <p:spPr>
+          <a:xfrm>
+            <a:off x="199440" y="1861920"/>
+            <a:ext cx="3092400" cy="2618640"/>
+          </a:xfrm>
+          <a:prstGeom prst="rect">
+            <a:avLst/>
+          </a:prstGeom>
+          <a:ln>
+            <a:noFill/>
+          </a:ln>
+        </p:spPr>
+      </p:pic>
+      <p:pic>
+        <p:nvPicPr>
+          <p:cNvPr id="98" name="" descr=""/>
+          <p:cNvPicPr/>
+          <p:nvPr/>
+        </p:nvPicPr>
+        <p:blipFill>
+          <a:blip r:embed="rId3"/>
+          <a:stretch/>
+        </p:blipFill>
+        <p:spPr>
+          <a:xfrm>
+            <a:off x="6858000" y="1855080"/>
+            <a:ext cx="3025440" cy="2562120"/>
+          </a:xfrm>
+          <a:prstGeom prst="rect">
+            <a:avLst/>
+          </a:prstGeom>
+          <a:ln>
+            <a:noFill/>
+          </a:ln>
+        </p:spPr>
+      </p:pic>
+    </p:spTree>
+  </p:cSld>
+  <p:timing>
+    <p:tnLst>
+      <p:par>
+        <p:cTn id="19" dur="indefinite" restart="never" nodeType="tmRoot">
+          <p:childTnLst>
+            <p:seq>
+              <p:cTn id="20" dur="indefinite" nodeType="mainSeq"/>
               <p:prevCondLst>
                 <p:cond delay="0" evt="onPrev">
                   <p:tgtEl>
@@ -3418,8 +3588,8 @@
         </p:nvSpPr>
         <p:spPr>
           <a:xfrm>
-            <a:off x="504000" y="216000"/>
-            <a:ext cx="7019640" cy="935640"/>
+            <a:off x="503640" y="215640"/>
+            <a:ext cx="7016760" cy="935280"/>
           </a:xfrm>
           <a:prstGeom prst="rect">
             <a:avLst/>
@@ -3466,8 +3636,8 @@
         </p:nvSpPr>
         <p:spPr>
           <a:xfrm>
-            <a:off x="504000" y="1368000"/>
-            <a:ext cx="9071640" cy="3287880"/>
+            <a:off x="503640" y="1367640"/>
+            <a:ext cx="9068040" cy="3287160"/>
           </a:xfrm>
           <a:prstGeom prst="rect">
             <a:avLst/>
@@ -3677,8 +3847,8 @@
         </p:nvSpPr>
         <p:spPr>
           <a:xfrm>
-            <a:off x="504000" y="216000"/>
-            <a:ext cx="7019640" cy="935640"/>
+            <a:off x="503640" y="215640"/>
+            <a:ext cx="7016760" cy="935280"/>
           </a:xfrm>
           <a:prstGeom prst="rect">
             <a:avLst/>
@@ -3716,8 +3886,8 @@
         </p:blipFill>
         <p:spPr>
           <a:xfrm>
-            <a:off x="2377440" y="1409040"/>
-            <a:ext cx="5394960" cy="4168800"/>
+            <a:off x="2376360" y="1408680"/>
+            <a:ext cx="5392800" cy="4167720"/>
           </a:xfrm>
           <a:prstGeom prst="rect">
             <a:avLst/>
@@ -3784,8 +3954,8 @@
         </p:nvSpPr>
         <p:spPr>
           <a:xfrm>
-            <a:off x="504000" y="216000"/>
-            <a:ext cx="7019640" cy="935640"/>
+            <a:off x="503640" y="215640"/>
+            <a:ext cx="7016760" cy="935280"/>
           </a:xfrm>
           <a:prstGeom prst="rect">
             <a:avLst/>
@@ -3823,8 +3993,8 @@
         </p:blipFill>
         <p:spPr>
           <a:xfrm>
-            <a:off x="2221560" y="1280160"/>
-            <a:ext cx="5642280" cy="4359960"/>
+            <a:off x="2220480" y="1279800"/>
+            <a:ext cx="5640120" cy="4358880"/>
           </a:xfrm>
           <a:prstGeom prst="rect">
             <a:avLst/>
@@ -3891,8 +4061,8 @@
         </p:nvSpPr>
         <p:spPr>
           <a:xfrm>
-            <a:off x="504000" y="216000"/>
-            <a:ext cx="7019640" cy="935640"/>
+            <a:off x="503640" y="215640"/>
+            <a:ext cx="7016760" cy="935280"/>
           </a:xfrm>
           <a:prstGeom prst="rect">
             <a:avLst/>
@@ -3910,7 +4080,7 @@
               <a:rPr b="0" lang="en-US" sz="4400" spc="-1" strike="noStrike">
                 <a:latin typeface="Arial"/>
               </a:rPr>
-              <a:t>ATMega Code</a:t>
+              <a:t>ATMega Code Flow</a:t>
             </a:r>
             <a:endParaRPr b="0" lang="en-US" sz="4400" spc="-1" strike="noStrike">
               <a:latin typeface="Arial"/>
@@ -3926,8 +4096,8 @@
         </p:nvSpPr>
         <p:spPr>
           <a:xfrm>
-            <a:off x="504000" y="1368000"/>
-            <a:ext cx="9071640" cy="3287880"/>
+            <a:off x="503640" y="1367640"/>
+            <a:ext cx="9068040" cy="4025880"/>
           </a:xfrm>
           <a:prstGeom prst="rect">
             <a:avLst/>
@@ -3938,10 +4108,94 @@
           </a:ln>
         </p:spPr>
         <p:txBody>
-          <a:bodyPr lIns="0" rIns="0" tIns="0" bIns="0" anchor="ctr"/>
-          <a:p>
-            <a:pPr algn="ctr"/>
-            <a:endParaRPr b="0" lang="en-US" sz="3200" spc="-1" strike="noStrike">
+          <a:bodyPr lIns="0" rIns="0" tIns="0" bIns="0">
+            <a:normAutofit/>
+          </a:bodyPr>
+          <a:p>
+            <a:pPr marL="432000" indent="-324000">
+              <a:spcBef>
+                <a:spcPts val="1414"/>
+              </a:spcBef>
+              <a:buClr>
+                <a:srgbClr val="000000"/>
+              </a:buClr>
+              <a:buSzPct val="45000"/>
+              <a:buFont typeface="Wingdings" charset="2"/>
+              <a:buChar char=""/>
+            </a:pPr>
+            <a:r>
+              <a:rPr b="0" lang="en-US" sz="2400" spc="-1" strike="noStrike">
+                <a:latin typeface="Arial"/>
+              </a:rPr>
+              <a:t>ADC Init with commands DDRA,ADCSRA,ADMUX</a:t>
+            </a:r>
+            <a:endParaRPr b="0" lang="en-US" sz="2400" spc="-1" strike="noStrike">
+              <a:latin typeface="Arial"/>
+            </a:endParaRPr>
+          </a:p>
+          <a:p>
+            <a:pPr marL="432000" indent="-324000">
+              <a:spcBef>
+                <a:spcPts val="1414"/>
+              </a:spcBef>
+              <a:buClr>
+                <a:srgbClr val="000000"/>
+              </a:buClr>
+              <a:buSzPct val="45000"/>
+              <a:buFont typeface="Wingdings" charset="2"/>
+              <a:buChar char=""/>
+            </a:pPr>
+            <a:r>
+              <a:rPr b="0" lang="en-US" sz="2400" spc="-1" strike="noStrike">
+                <a:latin typeface="Arial"/>
+              </a:rPr>
+              <a:t>USART Init with commands ,UCSRC,UCSRB,UCSRB,UBRRH</a:t>
+            </a:r>
+            <a:endParaRPr b="0" lang="en-US" sz="2400" spc="-1" strike="noStrike">
+              <a:latin typeface="Arial"/>
+            </a:endParaRPr>
+          </a:p>
+          <a:p>
+            <a:pPr marL="432000" indent="-324000">
+              <a:spcBef>
+                <a:spcPts val="1414"/>
+              </a:spcBef>
+              <a:buClr>
+                <a:srgbClr val="000000"/>
+              </a:buClr>
+              <a:buSzPct val="45000"/>
+              <a:buFont typeface="Wingdings" charset="2"/>
+              <a:buChar char=""/>
+            </a:pPr>
+            <a:r>
+              <a:rPr b="0" lang="en-US" sz="2400" spc="-1" strike="noStrike">
+                <a:latin typeface="Arial"/>
+              </a:rPr>
+              <a:t>Infinite while loop with ADC read convertion of the analog value to Digital and convertion of the digital value to Celsius with the function (Celsius = (Value * 4.88))/10</a:t>
+            </a:r>
+            <a:endParaRPr b="0" lang="en-US" sz="2400" spc="-1" strike="noStrike">
+              <a:latin typeface="Arial"/>
+            </a:endParaRPr>
+          </a:p>
+          <a:p>
+            <a:pPr marL="432000" indent="-324000">
+              <a:spcBef>
+                <a:spcPts val="1414"/>
+              </a:spcBef>
+              <a:buClr>
+                <a:srgbClr val="000000"/>
+              </a:buClr>
+              <a:buSzPct val="45000"/>
+              <a:buFont typeface="Wingdings" charset="2"/>
+              <a:buChar char=""/>
+            </a:pPr>
+            <a:r>
+              <a:rPr b="0" lang="en-US" sz="2400" spc="-1" strike="noStrike">
+                <a:latin typeface="Arial"/>
+              </a:rPr>
+              <a:t>Transmit via USART the converted value to connected PC with the use of a FTDI 232</a:t>
+            </a:r>
+            <a:endParaRPr b="0" lang="en-US" sz="2400" spc="-1" strike="noStrike">
               <a:latin typeface="Arial"/>
             </a:endParaRPr>
           </a:p>
@@ -3949,6 +4203,724 @@
       </p:sp>
     </p:spTree>
   </p:cSld>
+  <p:timing>
+    <p:tnLst>
+      <p:par>
+        <p:cTn id="9" dur="indefinite" restart="never" nodeType="tmRoot">
+          <p:childTnLst>
+            <p:seq>
+              <p:cTn id="10" dur="indefinite" nodeType="mainSeq"/>
+              <p:prevCondLst>
+                <p:cond delay="0" evt="onPrev">
+                  <p:tgtEl>
+                    <p:sldTgt/>
+                  </p:tgtEl>
+                </p:cond>
+              </p:prevCondLst>
+              <p:nextCondLst>
+                <p:cond delay="0" evt="onNext">
+                  <p:tgtEl>
+                    <p:sldTgt/>
+                  </p:tgtEl>
+                </p:cond>
+              </p:nextCondLst>
+            </p:seq>
+          </p:childTnLst>
+        </p:cTn>
+      </p:par>
+    </p:tnLst>
+  </p:timing>
+</p:sld>
+</file>
+
+<file path=ppt/slides/slide6.xml><?xml version="1.0" encoding="utf-8"?>
+<p:sld xmlns:a="http://schemas.openxmlformats.org/drawingml/2006/main" xmlns:p="http://schemas.openxmlformats.org/presentationml/2006/main" xmlns:r="http://schemas.openxmlformats.org/officeDocument/2006/relationships" xmlns:p14="http://schemas.microsoft.com/office/powerpoint/2010/main" xmlns:p15="http://schemas.microsoft.com/office/powerpoint/2012/main" xmlns:mc="http://schemas.openxmlformats.org/markup-compatibility/2006">
+  <p:cSld>
+    <p:spTree>
+      <p:nvGrpSpPr>
+        <p:cNvPr id="1" name=""/>
+        <p:cNvGrpSpPr/>
+        <p:nvPr/>
+      </p:nvGrpSpPr>
+      <p:grpSpPr>
+        <a:xfrm>
+          <a:off x="0" y="0"/>
+          <a:ext cx="0" cy="0"/>
+          <a:chOff x="0" y="0"/>
+          <a:chExt cx="0" cy="0"/>
+        </a:xfrm>
+      </p:grpSpPr>
+      <p:sp>
+        <p:nvSpPr>
+          <p:cNvPr id="88" name="TextShape 1"/>
+          <p:cNvSpPr txBox="1"/>
+          <p:nvPr/>
+        </p:nvSpPr>
+        <p:spPr>
+          <a:xfrm>
+            <a:off x="503640" y="215640"/>
+            <a:ext cx="7016760" cy="935280"/>
+          </a:xfrm>
+          <a:prstGeom prst="rect">
+            <a:avLst/>
+          </a:prstGeom>
+          <a:noFill/>
+          <a:ln>
+            <a:noFill/>
+          </a:ln>
+        </p:spPr>
+        <p:txBody>
+          <a:bodyPr lIns="0" rIns="0" tIns="0" bIns="0" anchor="ctr"/>
+          <a:p>
+            <a:pPr algn="ctr"/>
+            <a:r>
+              <a:rPr b="0" lang="en-US" sz="4400" spc="-1" strike="noStrike">
+                <a:latin typeface="Arial"/>
+              </a:rPr>
+              <a:t>Software Requirements</a:t>
+            </a:r>
+            <a:endParaRPr b="0" lang="en-US" sz="4400" spc="-1" strike="noStrike">
+              <a:latin typeface="Arial"/>
+            </a:endParaRPr>
+          </a:p>
+        </p:txBody>
+      </p:sp>
+      <p:sp>
+        <p:nvSpPr>
+          <p:cNvPr id="89" name="TextShape 2"/>
+          <p:cNvSpPr txBox="1"/>
+          <p:nvPr/>
+        </p:nvSpPr>
+        <p:spPr>
+          <a:xfrm>
+            <a:off x="503640" y="1367640"/>
+            <a:ext cx="9068040" cy="4117320"/>
+          </a:xfrm>
+          <a:prstGeom prst="rect">
+            <a:avLst/>
+          </a:prstGeom>
+          <a:noFill/>
+          <a:ln>
+            <a:noFill/>
+          </a:ln>
+        </p:spPr>
+        <p:txBody>
+          <a:bodyPr lIns="0" rIns="0" tIns="0" bIns="0">
+            <a:normAutofit/>
+          </a:bodyPr>
+          <a:p>
+            <a:pPr marL="432000" indent="-324000">
+              <a:spcBef>
+                <a:spcPts val="1414"/>
+              </a:spcBef>
+              <a:buClr>
+                <a:srgbClr val="000000"/>
+              </a:buClr>
+              <a:buSzPct val="45000"/>
+              <a:buFont typeface="Wingdings" charset="2"/>
+              <a:buChar char=""/>
+            </a:pPr>
+            <a:r>
+              <a:rPr b="0" lang="en-US" sz="3200" spc="-1" strike="noStrike">
+                <a:latin typeface="Arial"/>
+              </a:rPr>
+              <a:t>Python 3.5</a:t>
+            </a:r>
+            <a:endParaRPr b="0" lang="en-US" sz="3200" spc="-1" strike="noStrike">
+              <a:latin typeface="Arial"/>
+            </a:endParaRPr>
+          </a:p>
+          <a:p>
+            <a:pPr marL="432000" indent="-324000">
+              <a:spcBef>
+                <a:spcPts val="1414"/>
+              </a:spcBef>
+              <a:buClr>
+                <a:srgbClr val="000000"/>
+              </a:buClr>
+              <a:buSzPct val="45000"/>
+              <a:buFont typeface="Wingdings" charset="2"/>
+              <a:buChar char=""/>
+            </a:pPr>
+            <a:r>
+              <a:rPr b="0" lang="en-US" sz="3200" spc="-1" strike="noStrike">
+                <a:latin typeface="Arial"/>
+              </a:rPr>
+              <a:t>Python library Serial</a:t>
+            </a:r>
+            <a:endParaRPr b="0" lang="en-US" sz="3200" spc="-1" strike="noStrike">
+              <a:latin typeface="Arial"/>
+            </a:endParaRPr>
+          </a:p>
+          <a:p>
+            <a:pPr marL="432000" indent="-324000">
+              <a:spcBef>
+                <a:spcPts val="1414"/>
+              </a:spcBef>
+              <a:buClr>
+                <a:srgbClr val="000000"/>
+              </a:buClr>
+              <a:buSzPct val="45000"/>
+              <a:buFont typeface="Wingdings" charset="2"/>
+              <a:buChar char=""/>
+            </a:pPr>
+            <a:r>
+              <a:rPr b="0" lang="en-US" sz="3200" spc="-1" strike="noStrike">
+                <a:latin typeface="Arial"/>
+              </a:rPr>
+              <a:t>Python Library Matplotlib</a:t>
+            </a:r>
+            <a:endParaRPr b="0" lang="en-US" sz="3200" spc="-1" strike="noStrike">
+              <a:latin typeface="Arial"/>
+            </a:endParaRPr>
+          </a:p>
+          <a:p>
+            <a:pPr marL="432000" indent="-324000">
+              <a:spcBef>
+                <a:spcPts val="1414"/>
+              </a:spcBef>
+              <a:buClr>
+                <a:srgbClr val="000000"/>
+              </a:buClr>
+              <a:buSzPct val="45000"/>
+              <a:buFont typeface="Wingdings" charset="2"/>
+              <a:buChar char=""/>
+            </a:pPr>
+            <a:r>
+              <a:rPr b="0" lang="en-US" sz="3200" spc="-1" strike="noStrike">
+                <a:latin typeface="Arial"/>
+              </a:rPr>
+              <a:t>Python Library drawnow</a:t>
+            </a:r>
+            <a:endParaRPr b="0" lang="en-US" sz="3200" spc="-1" strike="noStrike">
+              <a:latin typeface="Arial"/>
+            </a:endParaRPr>
+          </a:p>
+        </p:txBody>
+      </p:sp>
+    </p:spTree>
+  </p:cSld>
+  <p:timing>
+    <p:tnLst>
+      <p:par>
+        <p:cTn id="11" dur="indefinite" restart="never" nodeType="tmRoot">
+          <p:childTnLst>
+            <p:seq>
+              <p:cTn id="12" dur="indefinite" nodeType="mainSeq"/>
+              <p:prevCondLst>
+                <p:cond delay="0" evt="onPrev">
+                  <p:tgtEl>
+                    <p:sldTgt/>
+                  </p:tgtEl>
+                </p:cond>
+              </p:prevCondLst>
+              <p:nextCondLst>
+                <p:cond delay="0" evt="onNext">
+                  <p:tgtEl>
+                    <p:sldTgt/>
+                  </p:tgtEl>
+                </p:cond>
+              </p:nextCondLst>
+            </p:seq>
+          </p:childTnLst>
+        </p:cTn>
+      </p:par>
+    </p:tnLst>
+  </p:timing>
+</p:sld>
+</file>
+
+<file path=ppt/slides/slide7.xml><?xml version="1.0" encoding="utf-8"?>
+<p:sld xmlns:a="http://schemas.openxmlformats.org/drawingml/2006/main" xmlns:p="http://schemas.openxmlformats.org/presentationml/2006/main" xmlns:r="http://schemas.openxmlformats.org/officeDocument/2006/relationships" xmlns:p14="http://schemas.microsoft.com/office/powerpoint/2010/main" xmlns:p15="http://schemas.microsoft.com/office/powerpoint/2012/main" xmlns:mc="http://schemas.openxmlformats.org/markup-compatibility/2006">
+  <p:cSld>
+    <p:spTree>
+      <p:nvGrpSpPr>
+        <p:cNvPr id="1" name=""/>
+        <p:cNvGrpSpPr/>
+        <p:nvPr/>
+      </p:nvGrpSpPr>
+      <p:grpSpPr>
+        <a:xfrm>
+          <a:off x="0" y="0"/>
+          <a:ext cx="0" cy="0"/>
+          <a:chOff x="0" y="0"/>
+          <a:chExt cx="0" cy="0"/>
+        </a:xfrm>
+      </p:grpSpPr>
+      <p:sp>
+        <p:nvSpPr>
+          <p:cNvPr id="90" name="TextShape 1"/>
+          <p:cNvSpPr txBox="1"/>
+          <p:nvPr/>
+        </p:nvSpPr>
+        <p:spPr>
+          <a:xfrm>
+            <a:off x="503640" y="215640"/>
+            <a:ext cx="7016760" cy="935280"/>
+          </a:xfrm>
+          <a:prstGeom prst="rect">
+            <a:avLst/>
+          </a:prstGeom>
+          <a:noFill/>
+          <a:ln>
+            <a:noFill/>
+          </a:ln>
+        </p:spPr>
+        <p:txBody>
+          <a:bodyPr lIns="0" rIns="0" tIns="0" bIns="0" anchor="ctr"/>
+          <a:p>
+            <a:pPr algn="ctr"/>
+            <a:r>
+              <a:rPr b="0" lang="en-US" sz="4400" spc="-1" strike="noStrike">
+                <a:latin typeface="Arial"/>
+              </a:rPr>
+              <a:t>Python Code</a:t>
+            </a:r>
+            <a:endParaRPr b="0" lang="en-US" sz="4400" spc="-1" strike="noStrike">
+              <a:latin typeface="Arial"/>
+            </a:endParaRPr>
+          </a:p>
+        </p:txBody>
+      </p:sp>
+      <p:sp>
+        <p:nvSpPr>
+          <p:cNvPr id="91" name="TextShape 2"/>
+          <p:cNvSpPr txBox="1"/>
+          <p:nvPr/>
+        </p:nvSpPr>
+        <p:spPr>
+          <a:xfrm>
+            <a:off x="503640" y="1367640"/>
+            <a:ext cx="9068040" cy="4208760"/>
+          </a:xfrm>
+          <a:prstGeom prst="rect">
+            <a:avLst/>
+          </a:prstGeom>
+          <a:noFill/>
+          <a:ln>
+            <a:noFill/>
+          </a:ln>
+        </p:spPr>
+        <p:txBody>
+          <a:bodyPr lIns="0" rIns="0" tIns="0" bIns="0">
+            <a:normAutofit/>
+          </a:bodyPr>
+          <a:p>
+            <a:pPr marL="432000" indent="-324000">
+              <a:spcBef>
+                <a:spcPts val="1414"/>
+              </a:spcBef>
+              <a:buClr>
+                <a:srgbClr val="000000"/>
+              </a:buClr>
+              <a:buSzPct val="45000"/>
+              <a:buFont typeface="Wingdings" charset="2"/>
+              <a:buChar char=""/>
+            </a:pPr>
+            <a:r>
+              <a:rPr b="0" lang="en-US" sz="2600" spc="-1" strike="noStrike">
+                <a:latin typeface="Arial"/>
+              </a:rPr>
+              <a:t>Open serial port /dev/ttyUSB0 with baudrate 1200.</a:t>
+            </a:r>
+            <a:endParaRPr b="0" lang="en-US" sz="2600" spc="-1" strike="noStrike">
+              <a:latin typeface="Arial"/>
+            </a:endParaRPr>
+          </a:p>
+          <a:p>
+            <a:pPr marL="432000" indent="-324000">
+              <a:spcBef>
+                <a:spcPts val="1414"/>
+              </a:spcBef>
+              <a:buClr>
+                <a:srgbClr val="000000"/>
+              </a:buClr>
+              <a:buSzPct val="45000"/>
+              <a:buFont typeface="Wingdings" charset="2"/>
+              <a:buChar char=""/>
+            </a:pPr>
+            <a:r>
+              <a:rPr b="0" lang="en-US" sz="2600" spc="-1" strike="noStrike">
+                <a:latin typeface="Arial"/>
+              </a:rPr>
+              <a:t>Keep 2 list. One for temperature and one for average temperature</a:t>
+            </a:r>
+            <a:endParaRPr b="0" lang="en-US" sz="2600" spc="-1" strike="noStrike">
+              <a:latin typeface="Arial"/>
+            </a:endParaRPr>
+          </a:p>
+          <a:p>
+            <a:pPr marL="432000" indent="-324000">
+              <a:spcBef>
+                <a:spcPts val="1414"/>
+              </a:spcBef>
+              <a:buClr>
+                <a:srgbClr val="000000"/>
+              </a:buClr>
+              <a:buSzPct val="45000"/>
+              <a:buFont typeface="Wingdings" charset="2"/>
+              <a:buChar char=""/>
+            </a:pPr>
+            <a:r>
+              <a:rPr b="0" lang="en-US" sz="2600" spc="-1" strike="noStrike">
+                <a:latin typeface="Arial"/>
+              </a:rPr>
+              <a:t>In a try block we create a new file and in a while block we read the values from UART. We convert the values from string to float and we keep them in the temperature list</a:t>
+            </a:r>
+            <a:endParaRPr b="0" lang="en-US" sz="2600" spc="-1" strike="noStrike">
+              <a:latin typeface="Arial"/>
+            </a:endParaRPr>
+          </a:p>
+          <a:p>
+            <a:pPr marL="432000" indent="-324000">
+              <a:spcBef>
+                <a:spcPts val="1414"/>
+              </a:spcBef>
+              <a:buClr>
+                <a:srgbClr val="000000"/>
+              </a:buClr>
+              <a:buSzPct val="45000"/>
+              <a:buFont typeface="Wingdings" charset="2"/>
+              <a:buChar char=""/>
+            </a:pPr>
+            <a:r>
+              <a:rPr b="0" lang="en-US" sz="2600" spc="-1" strike="noStrike">
+                <a:latin typeface="Arial"/>
+              </a:rPr>
+              <a:t>We write the value with interpolation strings to the file</a:t>
+            </a:r>
+            <a:endParaRPr b="0" lang="en-US" sz="2600" spc="-1" strike="noStrike">
+              <a:latin typeface="Arial"/>
+            </a:endParaRPr>
+          </a:p>
+          <a:p>
+            <a:pPr marL="432000" indent="-324000">
+              <a:spcBef>
+                <a:spcPts val="1414"/>
+              </a:spcBef>
+              <a:buClr>
+                <a:srgbClr val="000000"/>
+              </a:buClr>
+              <a:buSzPct val="45000"/>
+              <a:buFont typeface="Wingdings" charset="2"/>
+              <a:buChar char=""/>
+            </a:pPr>
+            <a:r>
+              <a:rPr b="0" lang="en-US" sz="2600" spc="-1" strike="noStrike">
+                <a:latin typeface="Arial"/>
+              </a:rPr>
+              <a:t>……</a:t>
+            </a:r>
+            <a:r>
+              <a:rPr b="0" lang="en-US" sz="2600" spc="-1" strike="noStrike">
+                <a:latin typeface="Arial"/>
+              </a:rPr>
+              <a:t>..</a:t>
+            </a:r>
+            <a:endParaRPr b="0" lang="en-US" sz="2600" spc="-1" strike="noStrike">
+              <a:latin typeface="Arial"/>
+            </a:endParaRPr>
+          </a:p>
+        </p:txBody>
+      </p:sp>
+    </p:spTree>
+  </p:cSld>
+  <p:timing>
+    <p:tnLst>
+      <p:par>
+        <p:cTn id="13" dur="indefinite" restart="never" nodeType="tmRoot">
+          <p:childTnLst>
+            <p:seq>
+              <p:cTn id="14" dur="indefinite" nodeType="mainSeq"/>
+              <p:prevCondLst>
+                <p:cond delay="0" evt="onPrev">
+                  <p:tgtEl>
+                    <p:sldTgt/>
+                  </p:tgtEl>
+                </p:cond>
+              </p:prevCondLst>
+              <p:nextCondLst>
+                <p:cond delay="0" evt="onNext">
+                  <p:tgtEl>
+                    <p:sldTgt/>
+                  </p:tgtEl>
+                </p:cond>
+              </p:nextCondLst>
+            </p:seq>
+          </p:childTnLst>
+        </p:cTn>
+      </p:par>
+    </p:tnLst>
+  </p:timing>
+</p:sld>
+</file>
+
+<file path=ppt/slides/slide8.xml><?xml version="1.0" encoding="utf-8"?>
+<p:sld xmlns:a="http://schemas.openxmlformats.org/drawingml/2006/main" xmlns:p="http://schemas.openxmlformats.org/presentationml/2006/main" xmlns:r="http://schemas.openxmlformats.org/officeDocument/2006/relationships" xmlns:p14="http://schemas.microsoft.com/office/powerpoint/2010/main" xmlns:p15="http://schemas.microsoft.com/office/powerpoint/2012/main" xmlns:mc="http://schemas.openxmlformats.org/markup-compatibility/2006">
+  <p:cSld>
+    <p:spTree>
+      <p:nvGrpSpPr>
+        <p:cNvPr id="1" name=""/>
+        <p:cNvGrpSpPr/>
+        <p:nvPr/>
+      </p:nvGrpSpPr>
+      <p:grpSpPr>
+        <a:xfrm>
+          <a:off x="0" y="0"/>
+          <a:ext cx="0" cy="0"/>
+          <a:chOff x="0" y="0"/>
+          <a:chExt cx="0" cy="0"/>
+        </a:xfrm>
+      </p:grpSpPr>
+      <p:sp>
+        <p:nvSpPr>
+          <p:cNvPr id="92" name="TextShape 1"/>
+          <p:cNvSpPr txBox="1"/>
+          <p:nvPr/>
+        </p:nvSpPr>
+        <p:spPr>
+          <a:xfrm>
+            <a:off x="503640" y="1367640"/>
+            <a:ext cx="9068040" cy="3287160"/>
+          </a:xfrm>
+          <a:prstGeom prst="rect">
+            <a:avLst/>
+          </a:prstGeom>
+          <a:noFill/>
+          <a:ln>
+            <a:noFill/>
+          </a:ln>
+        </p:spPr>
+        <p:txBody>
+          <a:bodyPr lIns="0" rIns="0" tIns="0" bIns="0">
+            <a:normAutofit/>
+          </a:bodyPr>
+          <a:p>
+            <a:pPr marL="432000" indent="-324000">
+              <a:spcBef>
+                <a:spcPts val="1414"/>
+              </a:spcBef>
+              <a:buClr>
+                <a:srgbClr val="000000"/>
+              </a:buClr>
+              <a:buSzPct val="45000"/>
+              <a:buFont typeface="Wingdings" charset="2"/>
+              <a:buChar char=""/>
+            </a:pPr>
+            <a:r>
+              <a:rPr b="0" lang="en-US" sz="3200" spc="-1" strike="noStrike">
+                <a:latin typeface="Arial"/>
+              </a:rPr>
+              <a:t>We append the values to the temperature list</a:t>
+            </a:r>
+            <a:endParaRPr b="0" lang="en-US" sz="3200" spc="-1" strike="noStrike">
+              <a:latin typeface="Arial"/>
+            </a:endParaRPr>
+          </a:p>
+          <a:p>
+            <a:pPr marL="432000" indent="-324000">
+              <a:spcBef>
+                <a:spcPts val="1414"/>
+              </a:spcBef>
+              <a:buClr>
+                <a:srgbClr val="000000"/>
+              </a:buClr>
+              <a:buSzPct val="45000"/>
+              <a:buFont typeface="Wingdings" charset="2"/>
+              <a:buChar char=""/>
+            </a:pPr>
+            <a:r>
+              <a:rPr b="0" lang="en-US" sz="3200" spc="-1" strike="noStrike">
+                <a:latin typeface="Arial"/>
+              </a:rPr>
+              <a:t>We setup matplotlib plot </a:t>
+            </a:r>
+            <a:endParaRPr b="0" lang="en-US" sz="3200" spc="-1" strike="noStrike">
+              <a:latin typeface="Arial"/>
+            </a:endParaRPr>
+          </a:p>
+          <a:p>
+            <a:pPr marL="432000" indent="-324000">
+              <a:spcBef>
+                <a:spcPts val="1414"/>
+              </a:spcBef>
+              <a:buClr>
+                <a:srgbClr val="000000"/>
+              </a:buClr>
+              <a:buSzPct val="45000"/>
+              <a:buFont typeface="Wingdings" charset="2"/>
+              <a:buChar char=""/>
+            </a:pPr>
+            <a:r>
+              <a:rPr b="0" lang="en-US" sz="3200" spc="-1" strike="noStrike">
+                <a:latin typeface="Arial"/>
+              </a:rPr>
+              <a:t>We calculate the average temperature and we append the value to the average list</a:t>
+            </a:r>
+            <a:endParaRPr b="0" lang="en-US" sz="3200" spc="-1" strike="noStrike">
+              <a:latin typeface="Arial"/>
+            </a:endParaRPr>
+          </a:p>
+          <a:p>
+            <a:pPr marL="432000" indent="-324000">
+              <a:spcBef>
+                <a:spcPts val="1414"/>
+              </a:spcBef>
+              <a:buClr>
+                <a:srgbClr val="000000"/>
+              </a:buClr>
+              <a:buSzPct val="45000"/>
+              <a:buFont typeface="Wingdings" charset="2"/>
+              <a:buChar char=""/>
+            </a:pPr>
+            <a:r>
+              <a:rPr b="0" lang="en-US" sz="3200" spc="-1" strike="noStrike">
+                <a:latin typeface="Arial"/>
+              </a:rPr>
+              <a:t>If the length of the two lists is bigger that 50 we remove(pop) the first element of the list. This is necessary for keeping the render of the plot at maximun 50 steps</a:t>
+            </a:r>
+            <a:endParaRPr b="0" lang="en-US" sz="3200" spc="-1" strike="noStrike">
+              <a:latin typeface="Arial"/>
+            </a:endParaRPr>
+          </a:p>
+        </p:txBody>
+      </p:sp>
+    </p:spTree>
+  </p:cSld>
+  <p:timing>
+    <p:tnLst>
+      <p:par>
+        <p:cTn id="15" dur="indefinite" restart="never" nodeType="tmRoot">
+          <p:childTnLst>
+            <p:seq>
+              <p:cTn id="16" dur="indefinite" nodeType="mainSeq"/>
+              <p:prevCondLst>
+                <p:cond delay="0" evt="onPrev">
+                  <p:tgtEl>
+                    <p:sldTgt/>
+                  </p:tgtEl>
+                </p:cond>
+              </p:prevCondLst>
+              <p:nextCondLst>
+                <p:cond delay="0" evt="onNext">
+                  <p:tgtEl>
+                    <p:sldTgt/>
+                  </p:tgtEl>
+                </p:cond>
+              </p:nextCondLst>
+            </p:seq>
+          </p:childTnLst>
+        </p:cTn>
+      </p:par>
+    </p:tnLst>
+  </p:timing>
+</p:sld>
+</file>
+
+<file path=ppt/slides/slide9.xml><?xml version="1.0" encoding="utf-8"?>
+<p:sld xmlns:a="http://schemas.openxmlformats.org/drawingml/2006/main" xmlns:p="http://schemas.openxmlformats.org/presentationml/2006/main" xmlns:r="http://schemas.openxmlformats.org/officeDocument/2006/relationships" xmlns:p14="http://schemas.microsoft.com/office/powerpoint/2010/main" xmlns:p15="http://schemas.microsoft.com/office/powerpoint/2012/main" xmlns:mc="http://schemas.openxmlformats.org/markup-compatibility/2006">
+  <p:cSld>
+    <p:spTree>
+      <p:nvGrpSpPr>
+        <p:cNvPr id="1" name=""/>
+        <p:cNvGrpSpPr/>
+        <p:nvPr/>
+      </p:nvGrpSpPr>
+      <p:grpSpPr>
+        <a:xfrm>
+          <a:off x="0" y="0"/>
+          <a:ext cx="0" cy="0"/>
+          <a:chOff x="0" y="0"/>
+          <a:chExt cx="0" cy="0"/>
+        </a:xfrm>
+      </p:grpSpPr>
+      <p:sp>
+        <p:nvSpPr>
+          <p:cNvPr id="93" name="TextShape 1"/>
+          <p:cNvSpPr txBox="1"/>
+          <p:nvPr/>
+        </p:nvSpPr>
+        <p:spPr>
+          <a:xfrm>
+            <a:off x="503640" y="215640"/>
+            <a:ext cx="7016760" cy="935280"/>
+          </a:xfrm>
+          <a:prstGeom prst="rect">
+            <a:avLst/>
+          </a:prstGeom>
+          <a:noFill/>
+          <a:ln>
+            <a:noFill/>
+          </a:ln>
+        </p:spPr>
+        <p:txBody>
+          <a:bodyPr lIns="0" rIns="0" tIns="0" bIns="0" anchor="ctr"/>
+          <a:p>
+            <a:pPr algn="ctr"/>
+            <a:r>
+              <a:rPr b="0" lang="en-US" sz="4400" spc="-1" strike="noStrike">
+                <a:latin typeface="Arial"/>
+              </a:rPr>
+              <a:t>The Hardware</a:t>
+            </a:r>
+            <a:endParaRPr b="0" lang="en-US" sz="4400" spc="-1" strike="noStrike">
+              <a:latin typeface="Arial"/>
+            </a:endParaRPr>
+          </a:p>
+        </p:txBody>
+      </p:sp>
+      <p:pic>
+        <p:nvPicPr>
+          <p:cNvPr id="94" name="" descr=""/>
+          <p:cNvPicPr/>
+          <p:nvPr/>
+        </p:nvPicPr>
+        <p:blipFill>
+          <a:blip r:embed="rId1"/>
+          <a:stretch/>
+        </p:blipFill>
+        <p:spPr>
+          <a:xfrm>
+            <a:off x="4113000" y="1367280"/>
+            <a:ext cx="2379240" cy="4230720"/>
+          </a:xfrm>
+          <a:prstGeom prst="rect">
+            <a:avLst/>
+          </a:prstGeom>
+          <a:ln>
+            <a:noFill/>
+          </a:ln>
+        </p:spPr>
+      </p:pic>
+    </p:spTree>
+  </p:cSld>
+  <p:timing>
+    <p:tnLst>
+      <p:par>
+        <p:cTn id="17" dur="indefinite" restart="never" nodeType="tmRoot">
+          <p:childTnLst>
+            <p:seq>
+              <p:cTn id="18" dur="indefinite" nodeType="mainSeq"/>
+              <p:prevCondLst>
+                <p:cond delay="0" evt="onPrev">
+                  <p:tgtEl>
+                    <p:sldTgt/>
+                  </p:tgtEl>
+                </p:cond>
+              </p:prevCondLst>
+              <p:nextCondLst>
+                <p:cond delay="0" evt="onNext">
+                  <p:tgtEl>
+                    <p:sldTgt/>
+                  </p:tgtEl>
+                </p:cond>
+              </p:nextCondLst>
+            </p:seq>
+          </p:childTnLst>
+        </p:cTn>
+      </p:par>
+    </p:tnLst>
+  </p:timing>
 </p:sld>
 </file>
 

</xml_diff>